<commit_message>
Translations of layouts for el-GR, fr-FR, it-IT, ko-KR, pl-PL, pt-BR
</commit_message>
<xml_diff>
--- a/new/el-GR/new.pptx
+++ b/new/el-GR/new.pptx
@@ -142,7 +142,7 @@
       </p:grpSpPr>
       <p:sp>
         <p:nvSpPr>
-          <p:cNvPr id="2" name="Header Placeholder 1"/>
+          <p:cNvPr id="2" name="Θέση κεφαλίδας 1"/>
           <p:cNvSpPr>
             <a:spLocks noGrp="1"/>
           </p:cNvSpPr>
@@ -173,7 +173,7 @@
       </p:sp>
       <p:sp>
         <p:nvSpPr>
-          <p:cNvPr id="3" name="Date Placeholder 2"/>
+          <p:cNvPr id="3" name="Θέση ημερομηνίας 2"/>
           <p:cNvSpPr>
             <a:spLocks noGrp="1"/>
           </p:cNvSpPr>
@@ -208,7 +208,7 @@
       </p:sp>
       <p:sp>
         <p:nvSpPr>
-          <p:cNvPr id="4" name="Slide Image Placeholder 3"/>
+          <p:cNvPr id="4" name="Θέση εικόνας διαφανειών 3"/>
           <p:cNvSpPr>
             <a:spLocks noGrp="1" noRot="1" noChangeAspect="1"/>
           </p:cNvSpPr>
@@ -241,7 +241,7 @@
       </p:sp>
       <p:sp>
         <p:nvSpPr>
-          <p:cNvPr id="5" name="Notes Placeholder 4"/>
+          <p:cNvPr id="5" name="Θέση σημειώσεις 4"/>
           <p:cNvSpPr>
             <a:spLocks noGrp="1"/>
           </p:cNvSpPr>
@@ -265,43 +265,43 @@
             <a:pPr lvl="0"/>
             <a:r>
               <a:rPr lang="el-GR" smtClean="0"/>
-              <a:t>Click to edit Master text styles</a:t>
+              <a:t>Στυλ υποδείγματος κειμένου</a:t>
             </a:r>
           </a:p>
           <a:p>
             <a:pPr lvl="1"/>
             <a:r>
               <a:rPr lang="el-GR" smtClean="0"/>
-              <a:t>Second level</a:t>
+              <a:t>Δεύτερου επιπέδου</a:t>
             </a:r>
           </a:p>
           <a:p>
             <a:pPr lvl="2"/>
             <a:r>
               <a:rPr lang="el-GR" smtClean="0"/>
-              <a:t>Third level</a:t>
+              <a:t>Τρίτου επιπέδου</a:t>
             </a:r>
           </a:p>
           <a:p>
             <a:pPr lvl="3"/>
             <a:r>
               <a:rPr lang="el-GR" smtClean="0"/>
-              <a:t>Fourth level</a:t>
+              <a:t>Τέταρτου επιπέδου</a:t>
             </a:r>
           </a:p>
           <a:p>
             <a:pPr lvl="4"/>
             <a:r>
               <a:rPr lang="el-GR" smtClean="0"/>
-              <a:t>Fifth level</a:t>
-            </a:r>
-            <a:endParaRPr lang="el-GR"/>
-          </a:p>
-        </p:txBody>
-      </p:sp>
-      <p:sp>
-        <p:nvSpPr>
-          <p:cNvPr id="6" name="Footer Placeholder 5"/>
+              <a:t>Πέμπτου επιπέδου</a:t>
+            </a:r>
+            <a:endParaRPr lang="el-GR"/>
+          </a:p>
+        </p:txBody>
+      </p:sp>
+      <p:sp>
+        <p:nvSpPr>
+          <p:cNvPr id="6" name="Θέση υποσέλιδου 5"/>
           <p:cNvSpPr>
             <a:spLocks noGrp="1"/>
           </p:cNvSpPr>
@@ -332,7 +332,7 @@
       </p:sp>
       <p:sp>
         <p:nvSpPr>
-          <p:cNvPr id="7" name="Slide Number Placeholder 6"/>
+          <p:cNvPr id="7" name="Θέση αριθμού διαφάνειας 6"/>
           <p:cNvSpPr>
             <a:spLocks noGrp="1"/>
           </p:cNvSpPr>
@@ -487,7 +487,7 @@
       </p:grpSpPr>
       <p:sp>
         <p:nvSpPr>
-          <p:cNvPr id="2" name="Slide Image Placeholder 1"/>
+          <p:cNvPr id="2" name="Θέση εικόνας διαφανειών 1"/>
           <p:cNvSpPr>
             <a:spLocks noGrp="1" noRot="1" noChangeAspect="1"/>
           </p:cNvSpPr>
@@ -504,7 +504,7 @@
       </p:sp>
       <p:sp>
         <p:nvSpPr>
-          <p:cNvPr id="3" name="Notes Placeholder 2"/>
+          <p:cNvPr id="3" name="Θέση σημειώσεις 2"/>
           <p:cNvSpPr>
             <a:spLocks noGrp="1"/>
           </p:cNvSpPr>
@@ -526,7 +526,7 @@
       </p:sp>
       <p:sp>
         <p:nvSpPr>
-          <p:cNvPr id="4" name="Slide Number Placeholder 3"/>
+          <p:cNvPr id="4" name="Θέση αριθμού διαφάνειας 3"/>
           <p:cNvSpPr>
             <a:spLocks noGrp="1"/>
           </p:cNvSpPr>
@@ -562,7 +562,7 @@
 
 <file path=ppt/slideLayouts/slideLayout1.xml><?xml version="1.0" encoding="utf-8"?>
 <p:sldLayout xmlns:a="http://schemas.openxmlformats.org/drawingml/2006/main" xmlns:r="http://schemas.openxmlformats.org/officeDocument/2006/relationships" xmlns:p="http://schemas.openxmlformats.org/presentationml/2006/main" type="title" preserve="1">
-  <p:cSld name="Title Slide">
+  <p:cSld name="Διαφάνεια τίτλου">
     <p:spTree>
       <p:nvGrpSpPr>
         <p:cNvPr id="1" name=""/>
@@ -579,7 +579,7 @@
       </p:grpSpPr>
       <p:sp>
         <p:nvSpPr>
-          <p:cNvPr id="2" name="Title 1"/>
+          <p:cNvPr id="2" name="Τίτλος 1"/>
           <p:cNvSpPr>
             <a:spLocks noGrp="1"/>
           </p:cNvSpPr>
@@ -603,7 +603,7 @@
           <a:p>
             <a:r>
               <a:rPr lang="el-GR" smtClean="0"/>
-              <a:t>Click to edit Master title style</a:t>
+              <a:t>Στυλ κύριου τίτλου</a:t>
             </a:r>
             <a:endParaRPr lang="el-GR" dirty="0"/>
           </a:p>
@@ -611,7 +611,7 @@
       </p:sp>
       <p:sp>
         <p:nvSpPr>
-          <p:cNvPr id="3" name="Subtitle 2"/>
+          <p:cNvPr id="3" name="Υπότιτλος 2"/>
           <p:cNvSpPr>
             <a:spLocks noGrp="1"/>
           </p:cNvSpPr>
@@ -668,7 +668,7 @@
           <a:p>
             <a:r>
               <a:rPr lang="el-GR" smtClean="0"/>
-              <a:t>Click to edit Master subtitle style</a:t>
+              <a:t>Στυλ κύριου υπότιτλου</a:t>
             </a:r>
             <a:endParaRPr lang="el-GR" dirty="0"/>
           </a:p>
@@ -676,7 +676,7 @@
       </p:sp>
       <p:sp>
         <p:nvSpPr>
-          <p:cNvPr id="4" name="Date Placeholder 3"/>
+          <p:cNvPr id="4" name="Θέση ημερομηνίας 3"/>
           <p:cNvSpPr>
             <a:spLocks noGrp="1"/>
           </p:cNvSpPr>
@@ -699,7 +699,7 @@
       </p:sp>
       <p:sp>
         <p:nvSpPr>
-          <p:cNvPr id="5" name="Footer Placeholder 4"/>
+          <p:cNvPr id="5" name="Θέση υποσέλιδου 4"/>
           <p:cNvSpPr>
             <a:spLocks noGrp="1"/>
           </p:cNvSpPr>
@@ -718,7 +718,7 @@
       </p:sp>
       <p:sp>
         <p:nvSpPr>
-          <p:cNvPr id="6" name="Slide Number Placeholder 5"/>
+          <p:cNvPr id="6" name="Θέση αριθμού διαφάνειας 5"/>
           <p:cNvSpPr>
             <a:spLocks noGrp="1"/>
           </p:cNvSpPr>
@@ -754,7 +754,7 @@
 
 <file path=ppt/slideLayouts/slideLayout10.xml><?xml version="1.0" encoding="utf-8"?>
 <p:sldLayout xmlns:a="http://schemas.openxmlformats.org/drawingml/2006/main" xmlns:r="http://schemas.openxmlformats.org/officeDocument/2006/relationships" xmlns:p="http://schemas.openxmlformats.org/presentationml/2006/main" type="vertTx" preserve="1">
-  <p:cSld name="Title and Vertical Text">
+  <p:cSld name="Τίτλος και Κατακόρυφο κείμενο">
     <p:spTree>
       <p:nvGrpSpPr>
         <p:cNvPr id="1" name=""/>
@@ -771,7 +771,7 @@
       </p:grpSpPr>
       <p:sp>
         <p:nvSpPr>
-          <p:cNvPr id="2" name="Title 1"/>
+          <p:cNvPr id="2" name="Τίτλος 1"/>
           <p:cNvSpPr>
             <a:spLocks noGrp="1"/>
           </p:cNvSpPr>
@@ -786,7 +786,7 @@
           <a:p>
             <a:r>
               <a:rPr lang="el-GR" smtClean="0"/>
-              <a:t>Click to edit Master title style</a:t>
+              <a:t>Στυλ κύριου τίτλου</a:t>
             </a:r>
             <a:endParaRPr lang="el-GR" dirty="0"/>
           </a:p>
@@ -794,7 +794,7 @@
       </p:sp>
       <p:sp>
         <p:nvSpPr>
-          <p:cNvPr id="3" name="Vertical Text Placeholder 2"/>
+          <p:cNvPr id="3" name="Θέση κατακόρυφου κειμένου 2"/>
           <p:cNvSpPr>
             <a:spLocks noGrp="1"/>
           </p:cNvSpPr>
@@ -810,35 +810,35 @@
             <a:pPr lvl="0"/>
             <a:r>
               <a:rPr lang="el-GR" smtClean="0"/>
-              <a:t>Click to edit Master text styles</a:t>
+              <a:t>Στυλ υποδείγματος κειμένου</a:t>
             </a:r>
           </a:p>
           <a:p>
             <a:pPr lvl="1"/>
             <a:r>
               <a:rPr lang="el-GR" smtClean="0"/>
-              <a:t>Second level</a:t>
+              <a:t>Δεύτερου επιπέδου</a:t>
             </a:r>
           </a:p>
           <a:p>
             <a:pPr lvl="2"/>
             <a:r>
               <a:rPr lang="el-GR" smtClean="0"/>
-              <a:t>Third level</a:t>
+              <a:t>Τρίτου επιπέδου</a:t>
             </a:r>
           </a:p>
           <a:p>
             <a:pPr lvl="3"/>
             <a:r>
               <a:rPr lang="el-GR" smtClean="0"/>
-              <a:t>Fourth level</a:t>
+              <a:t>Τέταρτου επιπέδου</a:t>
             </a:r>
           </a:p>
           <a:p>
             <a:pPr lvl="4"/>
             <a:r>
               <a:rPr lang="el-GR" smtClean="0"/>
-              <a:t>Fifth level</a:t>
+              <a:t>Πέμπτου επιπέδου</a:t>
             </a:r>
             <a:endParaRPr lang="el-GR" dirty="0"/>
           </a:p>
@@ -846,7 +846,7 @@
       </p:sp>
       <p:sp>
         <p:nvSpPr>
-          <p:cNvPr id="4" name="Date Placeholder 3"/>
+          <p:cNvPr id="4" name="Θέση ημερομηνίας 3"/>
           <p:cNvSpPr>
             <a:spLocks noGrp="1"/>
           </p:cNvSpPr>
@@ -869,7 +869,7 @@
       </p:sp>
       <p:sp>
         <p:nvSpPr>
-          <p:cNvPr id="5" name="Footer Placeholder 4"/>
+          <p:cNvPr id="5" name="Θέση υποσέλιδου 4"/>
           <p:cNvSpPr>
             <a:spLocks noGrp="1"/>
           </p:cNvSpPr>
@@ -888,7 +888,7 @@
       </p:sp>
       <p:sp>
         <p:nvSpPr>
-          <p:cNvPr id="6" name="Slide Number Placeholder 5"/>
+          <p:cNvPr id="6" name="Θέση αριθμού διαφάνειας 5"/>
           <p:cNvSpPr>
             <a:spLocks noGrp="1"/>
           </p:cNvSpPr>
@@ -924,7 +924,7 @@
 
 <file path=ppt/slideLayouts/slideLayout11.xml><?xml version="1.0" encoding="utf-8"?>
 <p:sldLayout xmlns:a="http://schemas.openxmlformats.org/drawingml/2006/main" xmlns:r="http://schemas.openxmlformats.org/officeDocument/2006/relationships" xmlns:p="http://schemas.openxmlformats.org/presentationml/2006/main" type="vertTitleAndTx" preserve="1">
-  <p:cSld name="Vertical Title and Text">
+  <p:cSld name="Κατακόρυφος τίτλος και Κείμενο">
     <p:spTree>
       <p:nvGrpSpPr>
         <p:cNvPr id="1" name=""/>
@@ -941,7 +941,7 @@
       </p:grpSpPr>
       <p:sp>
         <p:nvSpPr>
-          <p:cNvPr id="2" name="Vertical Title 1"/>
+          <p:cNvPr id="2" name="Κατακόρυφος τίτλος 1"/>
           <p:cNvSpPr>
             <a:spLocks noGrp="1"/>
           </p:cNvSpPr>
@@ -961,7 +961,7 @@
           <a:p>
             <a:r>
               <a:rPr lang="el-GR" smtClean="0"/>
-              <a:t>Click to edit Master title style</a:t>
+              <a:t>Στυλ κύριου τίτλου</a:t>
             </a:r>
             <a:endParaRPr lang="el-GR" dirty="0"/>
           </a:p>
@@ -969,7 +969,7 @@
       </p:sp>
       <p:sp>
         <p:nvSpPr>
-          <p:cNvPr id="3" name="Vertical Text Placeholder 2"/>
+          <p:cNvPr id="3" name="Θέση κατακόρυφου κειμένου 2"/>
           <p:cNvSpPr>
             <a:spLocks noGrp="1"/>
           </p:cNvSpPr>
@@ -990,35 +990,35 @@
             <a:pPr lvl="0"/>
             <a:r>
               <a:rPr lang="el-GR" smtClean="0"/>
-              <a:t>Click to edit Master text styles</a:t>
+              <a:t>Στυλ υποδείγματος κειμένου</a:t>
             </a:r>
           </a:p>
           <a:p>
             <a:pPr lvl="1"/>
             <a:r>
               <a:rPr lang="el-GR" smtClean="0"/>
-              <a:t>Second level</a:t>
+              <a:t>Δεύτερου επιπέδου</a:t>
             </a:r>
           </a:p>
           <a:p>
             <a:pPr lvl="2"/>
             <a:r>
               <a:rPr lang="el-GR" smtClean="0"/>
-              <a:t>Third level</a:t>
+              <a:t>Τρίτου επιπέδου</a:t>
             </a:r>
           </a:p>
           <a:p>
             <a:pPr lvl="3"/>
             <a:r>
               <a:rPr lang="el-GR" smtClean="0"/>
-              <a:t>Fourth level</a:t>
+              <a:t>Τέταρτου επιπέδου</a:t>
             </a:r>
           </a:p>
           <a:p>
             <a:pPr lvl="4"/>
             <a:r>
               <a:rPr lang="el-GR" smtClean="0"/>
-              <a:t>Fifth level</a:t>
+              <a:t>Πέμπτου επιπέδου</a:t>
             </a:r>
             <a:endParaRPr lang="el-GR" dirty="0"/>
           </a:p>
@@ -1026,7 +1026,7 @@
       </p:sp>
       <p:sp>
         <p:nvSpPr>
-          <p:cNvPr id="4" name="Date Placeholder 3"/>
+          <p:cNvPr id="4" name="Θέση ημερομηνίας 3"/>
           <p:cNvSpPr>
             <a:spLocks noGrp="1"/>
           </p:cNvSpPr>
@@ -1049,7 +1049,7 @@
       </p:sp>
       <p:sp>
         <p:nvSpPr>
-          <p:cNvPr id="5" name="Footer Placeholder 4"/>
+          <p:cNvPr id="5" name="Θέση υποσέλιδου 4"/>
           <p:cNvSpPr>
             <a:spLocks noGrp="1"/>
           </p:cNvSpPr>
@@ -1068,7 +1068,7 @@
       </p:sp>
       <p:sp>
         <p:nvSpPr>
-          <p:cNvPr id="6" name="Slide Number Placeholder 5"/>
+          <p:cNvPr id="6" name="Θέση αριθμού διαφάνειας 5"/>
           <p:cNvSpPr>
             <a:spLocks noGrp="1"/>
           </p:cNvSpPr>
@@ -1104,7 +1104,7 @@
 
 <file path=ppt/slideLayouts/slideLayout2.xml><?xml version="1.0" encoding="utf-8"?>
 <p:sldLayout xmlns:a="http://schemas.openxmlformats.org/drawingml/2006/main" xmlns:r="http://schemas.openxmlformats.org/officeDocument/2006/relationships" xmlns:p="http://schemas.openxmlformats.org/presentationml/2006/main" type="obj" preserve="1">
-  <p:cSld name="Title and Content">
+  <p:cSld name="Τίτλος και Περιεχόμενο">
     <p:spTree>
       <p:nvGrpSpPr>
         <p:cNvPr id="1" name=""/>
@@ -1121,7 +1121,7 @@
       </p:grpSpPr>
       <p:sp>
         <p:nvSpPr>
-          <p:cNvPr id="2" name="Title 1"/>
+          <p:cNvPr id="2" name="Τίτλος 1"/>
           <p:cNvSpPr>
             <a:spLocks noGrp="1"/>
           </p:cNvSpPr>
@@ -1136,7 +1136,7 @@
           <a:p>
             <a:r>
               <a:rPr lang="el-GR" smtClean="0"/>
-              <a:t>Click to edit Master title style</a:t>
+              <a:t>Στυλ κύριου τίτλου</a:t>
             </a:r>
             <a:endParaRPr lang="el-GR" dirty="0"/>
           </a:p>
@@ -1144,7 +1144,7 @@
       </p:sp>
       <p:sp>
         <p:nvSpPr>
-          <p:cNvPr id="3" name="Content Placeholder 2"/>
+          <p:cNvPr id="3" name="Θέση περιεχομένου 2"/>
           <p:cNvSpPr>
             <a:spLocks noGrp="1"/>
           </p:cNvSpPr>
@@ -1160,35 +1160,35 @@
             <a:pPr lvl="0"/>
             <a:r>
               <a:rPr lang="el-GR" smtClean="0"/>
-              <a:t>Click to edit Master text styles</a:t>
+              <a:t>Στυλ υποδείγματος κειμένου</a:t>
             </a:r>
           </a:p>
           <a:p>
             <a:pPr lvl="1"/>
             <a:r>
               <a:rPr lang="el-GR" smtClean="0"/>
-              <a:t>Second level</a:t>
+              <a:t>Δεύτερου επιπέδου</a:t>
             </a:r>
           </a:p>
           <a:p>
             <a:pPr lvl="2"/>
             <a:r>
               <a:rPr lang="el-GR" smtClean="0"/>
-              <a:t>Third level</a:t>
+              <a:t>Τρίτου επιπέδου</a:t>
             </a:r>
           </a:p>
           <a:p>
             <a:pPr lvl="3"/>
             <a:r>
               <a:rPr lang="el-GR" smtClean="0"/>
-              <a:t>Fourth level</a:t>
+              <a:t>Τέταρτου επιπέδου</a:t>
             </a:r>
           </a:p>
           <a:p>
             <a:pPr lvl="4"/>
             <a:r>
               <a:rPr lang="el-GR" smtClean="0"/>
-              <a:t>Fifth level</a:t>
+              <a:t>Πέμπτου επιπέδου</a:t>
             </a:r>
             <a:endParaRPr lang="el-GR" dirty="0"/>
           </a:p>
@@ -1196,7 +1196,7 @@
       </p:sp>
       <p:sp>
         <p:nvSpPr>
-          <p:cNvPr id="4" name="Date Placeholder 3"/>
+          <p:cNvPr id="4" name="Θέση ημερομηνίας 3"/>
           <p:cNvSpPr>
             <a:spLocks noGrp="1"/>
           </p:cNvSpPr>
@@ -1219,7 +1219,7 @@
       </p:sp>
       <p:sp>
         <p:nvSpPr>
-          <p:cNvPr id="5" name="Footer Placeholder 4"/>
+          <p:cNvPr id="5" name="Θέση υποσέλιδου 4"/>
           <p:cNvSpPr>
             <a:spLocks noGrp="1"/>
           </p:cNvSpPr>
@@ -1238,7 +1238,7 @@
       </p:sp>
       <p:sp>
         <p:nvSpPr>
-          <p:cNvPr id="6" name="Slide Number Placeholder 5"/>
+          <p:cNvPr id="6" name="Θέση αριθμού διαφάνειας 5"/>
           <p:cNvSpPr>
             <a:spLocks noGrp="1"/>
           </p:cNvSpPr>
@@ -1274,7 +1274,7 @@
 
 <file path=ppt/slideLayouts/slideLayout3.xml><?xml version="1.0" encoding="utf-8"?>
 <p:sldLayout xmlns:a="http://schemas.openxmlformats.org/drawingml/2006/main" xmlns:r="http://schemas.openxmlformats.org/officeDocument/2006/relationships" xmlns:p="http://schemas.openxmlformats.org/presentationml/2006/main" type="secHead" preserve="1">
-  <p:cSld name="Section Header">
+  <p:cSld name="Κεφαλίδα ενότητας">
     <p:spTree>
       <p:nvGrpSpPr>
         <p:cNvPr id="1" name=""/>
@@ -1291,7 +1291,7 @@
       </p:grpSpPr>
       <p:sp>
         <p:nvSpPr>
-          <p:cNvPr id="2" name="Title 1"/>
+          <p:cNvPr id="2" name="Τίτλος 1"/>
           <p:cNvSpPr>
             <a:spLocks noGrp="1"/>
           </p:cNvSpPr>
@@ -1315,7 +1315,7 @@
           <a:p>
             <a:r>
               <a:rPr lang="el-GR" smtClean="0"/>
-              <a:t>Click to edit Master title style</a:t>
+              <a:t>Στυλ κύριου τίτλου</a:t>
             </a:r>
             <a:endParaRPr lang="el-GR" dirty="0"/>
           </a:p>
@@ -1323,7 +1323,7 @@
       </p:sp>
       <p:sp>
         <p:nvSpPr>
-          <p:cNvPr id="3" name="Text Placeholder 2"/>
+          <p:cNvPr id="3" name="Θέση κειμένου 2"/>
           <p:cNvSpPr>
             <a:spLocks noGrp="1"/>
           </p:cNvSpPr>
@@ -1435,14 +1435,14 @@
             <a:pPr lvl="0"/>
             <a:r>
               <a:rPr lang="el-GR" smtClean="0"/>
-              <a:t>Click to edit Master text styles</a:t>
-            </a:r>
-          </a:p>
-        </p:txBody>
-      </p:sp>
-      <p:sp>
-        <p:nvSpPr>
-          <p:cNvPr id="4" name="Date Placeholder 3"/>
+              <a:t>Στυλ υποδείγματος κειμένου</a:t>
+            </a:r>
+          </a:p>
+        </p:txBody>
+      </p:sp>
+      <p:sp>
+        <p:nvSpPr>
+          <p:cNvPr id="4" name="Θέση ημερομηνίας 3"/>
           <p:cNvSpPr>
             <a:spLocks noGrp="1"/>
           </p:cNvSpPr>
@@ -1465,7 +1465,7 @@
       </p:sp>
       <p:sp>
         <p:nvSpPr>
-          <p:cNvPr id="5" name="Footer Placeholder 4"/>
+          <p:cNvPr id="5" name="Θέση υποσέλιδου 4"/>
           <p:cNvSpPr>
             <a:spLocks noGrp="1"/>
           </p:cNvSpPr>
@@ -1484,7 +1484,7 @@
       </p:sp>
       <p:sp>
         <p:nvSpPr>
-          <p:cNvPr id="6" name="Slide Number Placeholder 5"/>
+          <p:cNvPr id="6" name="Θέση αριθμού διαφάνειας 5"/>
           <p:cNvSpPr>
             <a:spLocks noGrp="1"/>
           </p:cNvSpPr>
@@ -1520,7 +1520,7 @@
 
 <file path=ppt/slideLayouts/slideLayout4.xml><?xml version="1.0" encoding="utf-8"?>
 <p:sldLayout xmlns:a="http://schemas.openxmlformats.org/drawingml/2006/main" xmlns:r="http://schemas.openxmlformats.org/officeDocument/2006/relationships" xmlns:p="http://schemas.openxmlformats.org/presentationml/2006/main" type="twoObj" preserve="1">
-  <p:cSld name="Two Content">
+  <p:cSld name="Δύο περιεχόμενα">
     <p:spTree>
       <p:nvGrpSpPr>
         <p:cNvPr id="1" name=""/>
@@ -1537,7 +1537,7 @@
       </p:grpSpPr>
       <p:sp>
         <p:nvSpPr>
-          <p:cNvPr id="2" name="Title 1"/>
+          <p:cNvPr id="2" name="Τίτλος 1"/>
           <p:cNvSpPr>
             <a:spLocks noGrp="1"/>
           </p:cNvSpPr>
@@ -1552,7 +1552,7 @@
           <a:p>
             <a:r>
               <a:rPr lang="el-GR" smtClean="0"/>
-              <a:t>Click to edit Master title style</a:t>
+              <a:t>Στυλ κύριου τίτλου</a:t>
             </a:r>
             <a:endParaRPr lang="el-GR" dirty="0"/>
           </a:p>
@@ -1560,7 +1560,7 @@
       </p:sp>
       <p:sp>
         <p:nvSpPr>
-          <p:cNvPr id="3" name="Content Placeholder 2"/>
+          <p:cNvPr id="3" name="Θέση περιεχομένου 2"/>
           <p:cNvSpPr>
             <a:spLocks noGrp="1"/>
           </p:cNvSpPr>
@@ -1581,28 +1581,28 @@
             <a:pPr lvl="0"/>
             <a:r>
               <a:rPr lang="el-GR" smtClean="0"/>
-              <a:t>Click to edit Master text styles</a:t>
+              <a:t>Στυλ υποδείγματος κειμένου</a:t>
             </a:r>
           </a:p>
           <a:p>
             <a:pPr lvl="1"/>
             <a:r>
               <a:rPr lang="el-GR" smtClean="0"/>
-              <a:t>Second level</a:t>
+              <a:t>Δεύτερου επιπέδου</a:t>
             </a:r>
           </a:p>
           <a:p>
             <a:pPr lvl="2"/>
             <a:r>
               <a:rPr lang="el-GR" smtClean="0"/>
-              <a:t>Third level</a:t>
+              <a:t>Τρίτου επιπέδου</a:t>
             </a:r>
           </a:p>
           <a:p>
             <a:pPr lvl="3"/>
             <a:r>
               <a:rPr lang="el-GR" smtClean="0"/>
-              <a:t>Fourth level</a:t>
+              <a:t>Τέταρτου επιπέδου</a:t>
             </a:r>
           </a:p>
           <a:p>
@@ -1617,7 +1617,6 @@
       </p:sp>
       <p:sp>
         <p:nvSpPr>
-          <p:cNvPr id="4" name="Content Placeholder 3"/>
           <p:cNvSpPr>
             <a:spLocks noGrp="1"/>
           </p:cNvSpPr>
@@ -1638,35 +1637,35 @@
             <a:pPr lvl="0"/>
             <a:r>
               <a:rPr lang="el-GR" smtClean="0"/>
-              <a:t>Click to edit Master text styles</a:t>
+              <a:t>Στυλ υποδείγματος κειμένου</a:t>
             </a:r>
           </a:p>
           <a:p>
             <a:pPr lvl="1"/>
             <a:r>
               <a:rPr lang="el-GR" smtClean="0"/>
-              <a:t>Second level</a:t>
+              <a:t>Δεύτερου επιπέδου</a:t>
             </a:r>
           </a:p>
           <a:p>
             <a:pPr lvl="2"/>
             <a:r>
               <a:rPr lang="el-GR" smtClean="0"/>
-              <a:t>Third level</a:t>
+              <a:t>Τρίτου επιπέδου</a:t>
             </a:r>
           </a:p>
           <a:p>
             <a:pPr lvl="3"/>
             <a:r>
               <a:rPr lang="el-GR" smtClean="0"/>
-              <a:t>Fourth level</a:t>
+              <a:t>Τέταρτου επιπέδου</a:t>
             </a:r>
           </a:p>
           <a:p>
             <a:pPr lvl="4"/>
             <a:r>
               <a:rPr lang="el-GR" smtClean="0"/>
-              <a:t>Fifth level</a:t>
+              <a:t>Πέμπτου επιπέδου</a:t>
             </a:r>
             <a:endParaRPr lang="el-GR" dirty="0"/>
           </a:p>
@@ -1674,7 +1673,7 @@
       </p:sp>
       <p:sp>
         <p:nvSpPr>
-          <p:cNvPr id="5" name="Date Placeholder 4"/>
+          <p:cNvPr id="5" name="Θέση ημερομηνίας 4"/>
           <p:cNvSpPr>
             <a:spLocks noGrp="1"/>
           </p:cNvSpPr>
@@ -1697,7 +1696,7 @@
       </p:sp>
       <p:sp>
         <p:nvSpPr>
-          <p:cNvPr id="6" name="Footer Placeholder 5"/>
+          <p:cNvPr id="6" name="Θέση υποσέλιδου 5"/>
           <p:cNvSpPr>
             <a:spLocks noGrp="1"/>
           </p:cNvSpPr>
@@ -1716,7 +1715,7 @@
       </p:sp>
       <p:sp>
         <p:nvSpPr>
-          <p:cNvPr id="7" name="Slide Number Placeholder 6"/>
+          <p:cNvPr id="7" name="Θέση αριθμού διαφάνειας 6"/>
           <p:cNvSpPr>
             <a:spLocks noGrp="1"/>
           </p:cNvSpPr>
@@ -1752,7 +1751,7 @@
 
 <file path=ppt/slideLayouts/slideLayout5.xml><?xml version="1.0" encoding="utf-8"?>
 <p:sldLayout xmlns:a="http://schemas.openxmlformats.org/drawingml/2006/main" xmlns:r="http://schemas.openxmlformats.org/officeDocument/2006/relationships" xmlns:p="http://schemas.openxmlformats.org/presentationml/2006/main" type="twoTxTwoObj" preserve="1">
-  <p:cSld name="Comparison">
+  <p:cSld name="Σύγκριση">
     <p:spTree>
       <p:nvGrpSpPr>
         <p:cNvPr id="1" name=""/>
@@ -1769,7 +1768,7 @@
       </p:grpSpPr>
       <p:sp>
         <p:nvSpPr>
-          <p:cNvPr id="2" name="Title 1"/>
+          <p:cNvPr id="2" name="Τίτλος 1"/>
           <p:cNvSpPr>
             <a:spLocks noGrp="1"/>
           </p:cNvSpPr>
@@ -1789,7 +1788,7 @@
           <a:p>
             <a:r>
               <a:rPr lang="el-GR" smtClean="0"/>
-              <a:t>Click to edit Master title style</a:t>
+              <a:t>Στυλ κύριου τίτλου</a:t>
             </a:r>
             <a:endParaRPr lang="el-GR" dirty="0"/>
           </a:p>
@@ -1797,7 +1796,7 @@
       </p:sp>
       <p:sp>
         <p:nvSpPr>
-          <p:cNvPr id="3" name="Text Placeholder 2"/>
+          <p:cNvPr id="3" name="Θέση κειμένου 2"/>
           <p:cNvSpPr>
             <a:spLocks noGrp="1"/>
           </p:cNvSpPr>
@@ -1855,14 +1854,14 @@
             <a:pPr lvl="0"/>
             <a:r>
               <a:rPr lang="el-GR" smtClean="0"/>
-              <a:t>Click to edit Master text styles</a:t>
-            </a:r>
-          </a:p>
-        </p:txBody>
-      </p:sp>
-      <p:sp>
-        <p:nvSpPr>
-          <p:cNvPr id="4" name="Content Placeholder 3"/>
+              <a:t>Στυλ υποδείγματος κειμένου</a:t>
+            </a:r>
+          </a:p>
+        </p:txBody>
+      </p:sp>
+      <p:sp>
+        <p:nvSpPr>
+          <p:cNvPr id="4" name="Θέση περιεχομένου 3"/>
           <p:cNvSpPr>
             <a:spLocks noGrp="1"/>
           </p:cNvSpPr>
@@ -1883,35 +1882,35 @@
             <a:pPr lvl="0"/>
             <a:r>
               <a:rPr lang="el-GR" smtClean="0"/>
-              <a:t>Click to edit Master text styles</a:t>
+              <a:t>Στυλ υποδείγματος κειμένου</a:t>
             </a:r>
           </a:p>
           <a:p>
             <a:pPr lvl="1"/>
             <a:r>
               <a:rPr lang="el-GR" smtClean="0"/>
-              <a:t>Second level</a:t>
+              <a:t>Δεύτερου επιπέδου</a:t>
             </a:r>
           </a:p>
           <a:p>
             <a:pPr lvl="2"/>
             <a:r>
               <a:rPr lang="el-GR" smtClean="0"/>
-              <a:t>Third level</a:t>
+              <a:t>Τρίτου επιπέδου</a:t>
             </a:r>
           </a:p>
           <a:p>
             <a:pPr lvl="3"/>
             <a:r>
               <a:rPr lang="el-GR" smtClean="0"/>
-              <a:t>Fourth level</a:t>
+              <a:t>Τέταρτου επιπέδου</a:t>
             </a:r>
           </a:p>
           <a:p>
             <a:pPr lvl="4"/>
             <a:r>
               <a:rPr lang="el-GR" smtClean="0"/>
-              <a:t>Fifth level</a:t>
+              <a:t>Πέμπτου επιπέδου</a:t>
             </a:r>
             <a:endParaRPr lang="el-GR" dirty="0"/>
           </a:p>
@@ -1919,7 +1918,7 @@
       </p:sp>
       <p:sp>
         <p:nvSpPr>
-          <p:cNvPr id="5" name="Text Placeholder 4"/>
+          <p:cNvPr id="5" name="Θέση κειμένου 4"/>
           <p:cNvSpPr>
             <a:spLocks noGrp="1"/>
           </p:cNvSpPr>
@@ -1977,14 +1976,14 @@
             <a:pPr lvl="0"/>
             <a:r>
               <a:rPr lang="el-GR" smtClean="0"/>
-              <a:t>Click to edit Master text styles</a:t>
-            </a:r>
-          </a:p>
-        </p:txBody>
-      </p:sp>
-      <p:sp>
-        <p:nvSpPr>
-          <p:cNvPr id="6" name="Content Placeholder 5"/>
+              <a:t>Στυλ υποδείγματος κειμένου</a:t>
+            </a:r>
+          </a:p>
+        </p:txBody>
+      </p:sp>
+      <p:sp>
+        <p:nvSpPr>
+          <p:cNvPr id="6" name="Θέση περιεχομένου 5"/>
           <p:cNvSpPr>
             <a:spLocks noGrp="1"/>
           </p:cNvSpPr>
@@ -2005,35 +2004,35 @@
             <a:pPr lvl="0"/>
             <a:r>
               <a:rPr lang="el-GR" smtClean="0"/>
-              <a:t>Click to edit Master text styles</a:t>
+              <a:t>Στυλ υποδείγματος κειμένου</a:t>
             </a:r>
           </a:p>
           <a:p>
             <a:pPr lvl="1"/>
             <a:r>
               <a:rPr lang="el-GR" smtClean="0"/>
-              <a:t>Second level</a:t>
+              <a:t>Δεύτερου επιπέδου</a:t>
             </a:r>
           </a:p>
           <a:p>
             <a:pPr lvl="2"/>
             <a:r>
               <a:rPr lang="el-GR" smtClean="0"/>
-              <a:t>Third level</a:t>
+              <a:t>Τρίτου επιπέδου</a:t>
             </a:r>
           </a:p>
           <a:p>
             <a:pPr lvl="3"/>
             <a:r>
               <a:rPr lang="el-GR" smtClean="0"/>
-              <a:t>Fourth level</a:t>
+              <a:t>Τέταρτου επιπέδου</a:t>
             </a:r>
           </a:p>
           <a:p>
             <a:pPr lvl="4"/>
             <a:r>
               <a:rPr lang="el-GR" smtClean="0"/>
-              <a:t>Fifth level</a:t>
+              <a:t>Πέμπτου επιπέδου</a:t>
             </a:r>
             <a:endParaRPr lang="el-GR" dirty="0"/>
           </a:p>
@@ -2041,7 +2040,7 @@
       </p:sp>
       <p:sp>
         <p:nvSpPr>
-          <p:cNvPr id="7" name="Date Placeholder 6"/>
+          <p:cNvPr id="7" name="Θέση ημερομηνίας 6"/>
           <p:cNvSpPr>
             <a:spLocks noGrp="1"/>
           </p:cNvSpPr>
@@ -2064,7 +2063,7 @@
       </p:sp>
       <p:sp>
         <p:nvSpPr>
-          <p:cNvPr id="8" name="Footer Placeholder 7"/>
+          <p:cNvPr id="8" name="Θέση υποσέλιδου 7"/>
           <p:cNvSpPr>
             <a:spLocks noGrp="1"/>
           </p:cNvSpPr>
@@ -2083,7 +2082,7 @@
       </p:sp>
       <p:sp>
         <p:nvSpPr>
-          <p:cNvPr id="9" name="Slide Number Placeholder 8"/>
+          <p:cNvPr id="9" name="Θέση αριθμού διαφάνειας 8"/>
           <p:cNvSpPr>
             <a:spLocks noGrp="1"/>
           </p:cNvSpPr>
@@ -2119,7 +2118,7 @@
 
 <file path=ppt/slideLayouts/slideLayout6.xml><?xml version="1.0" encoding="utf-8"?>
 <p:sldLayout xmlns:a="http://schemas.openxmlformats.org/drawingml/2006/main" xmlns:r="http://schemas.openxmlformats.org/officeDocument/2006/relationships" xmlns:p="http://schemas.openxmlformats.org/presentationml/2006/main" type="titleOnly" preserve="1">
-  <p:cSld name="Title Only">
+  <p:cSld name="Μόνο τίτλος">
     <p:spTree>
       <p:nvGrpSpPr>
         <p:cNvPr id="1" name=""/>
@@ -2136,7 +2135,7 @@
       </p:grpSpPr>
       <p:sp>
         <p:nvSpPr>
-          <p:cNvPr id="2" name="Title 1"/>
+          <p:cNvPr id="2" name="Τίτλος 1"/>
           <p:cNvSpPr>
             <a:spLocks noGrp="1"/>
           </p:cNvSpPr>
@@ -2151,7 +2150,7 @@
           <a:p>
             <a:r>
               <a:rPr lang="el-GR" smtClean="0"/>
-              <a:t>Click to edit Master title style</a:t>
+              <a:t>Στυλ κύριου τίτλου</a:t>
             </a:r>
             <a:endParaRPr lang="el-GR" dirty="0"/>
           </a:p>
@@ -2159,7 +2158,7 @@
       </p:sp>
       <p:sp>
         <p:nvSpPr>
-          <p:cNvPr id="3" name="Date Placeholder 2"/>
+          <p:cNvPr id="3" name="Θέση ημερομηνίας 2"/>
           <p:cNvSpPr>
             <a:spLocks noGrp="1"/>
           </p:cNvSpPr>
@@ -2182,7 +2181,7 @@
       </p:sp>
       <p:sp>
         <p:nvSpPr>
-          <p:cNvPr id="4" name="Footer Placeholder 3"/>
+          <p:cNvPr id="4" name="Θέση υποσέλιδου 3"/>
           <p:cNvSpPr>
             <a:spLocks noGrp="1"/>
           </p:cNvSpPr>
@@ -2201,7 +2200,7 @@
       </p:sp>
       <p:sp>
         <p:nvSpPr>
-          <p:cNvPr id="5" name="Slide Number Placeholder 4"/>
+          <p:cNvPr id="5" name="Θέση αριθμού διαφάνειας 4"/>
           <p:cNvSpPr>
             <a:spLocks noGrp="1"/>
           </p:cNvSpPr>
@@ -2237,7 +2236,7 @@
 
 <file path=ppt/slideLayouts/slideLayout7.xml><?xml version="1.0" encoding="utf-8"?>
 <p:sldLayout xmlns:a="http://schemas.openxmlformats.org/drawingml/2006/main" xmlns:r="http://schemas.openxmlformats.org/officeDocument/2006/relationships" xmlns:p="http://schemas.openxmlformats.org/presentationml/2006/main" type="blank" preserve="1">
-  <p:cSld name="Blank">
+  <p:cSld name="Κενή">
     <p:spTree>
       <p:nvGrpSpPr>
         <p:cNvPr id="1" name=""/>
@@ -2254,7 +2253,7 @@
       </p:grpSpPr>
       <p:sp>
         <p:nvSpPr>
-          <p:cNvPr id="2" name="Date Placeholder 1"/>
+          <p:cNvPr id="2" name="Θέση ημερομηνίας 1"/>
           <p:cNvSpPr>
             <a:spLocks noGrp="1"/>
           </p:cNvSpPr>
@@ -2277,7 +2276,7 @@
       </p:sp>
       <p:sp>
         <p:nvSpPr>
-          <p:cNvPr id="3" name="Footer Placeholder 2"/>
+          <p:cNvPr id="3" name="Θέση υποσέλιδου 2"/>
           <p:cNvSpPr>
             <a:spLocks noGrp="1"/>
           </p:cNvSpPr>
@@ -2296,7 +2295,7 @@
       </p:sp>
       <p:sp>
         <p:nvSpPr>
-          <p:cNvPr id="4" name="Slide Number Placeholder 3"/>
+          <p:cNvPr id="4" name="Θέση αριθμού διαφάνειας 3"/>
           <p:cNvSpPr>
             <a:spLocks noGrp="1"/>
           </p:cNvSpPr>
@@ -2332,7 +2331,7 @@
 
 <file path=ppt/slideLayouts/slideLayout8.xml><?xml version="1.0" encoding="utf-8"?>
 <p:sldLayout xmlns:a="http://schemas.openxmlformats.org/drawingml/2006/main" xmlns:r="http://schemas.openxmlformats.org/officeDocument/2006/relationships" xmlns:p="http://schemas.openxmlformats.org/presentationml/2006/main" type="objTx" preserve="1">
-  <p:cSld name="Content with Caption">
+  <p:cSld name="Περιεχόμενο με λεζάντα">
     <p:spTree>
       <p:nvGrpSpPr>
         <p:cNvPr id="1" name=""/>
@@ -2349,7 +2348,7 @@
       </p:grpSpPr>
       <p:sp>
         <p:nvSpPr>
-          <p:cNvPr id="2" name="Title 1"/>
+          <p:cNvPr id="2" name="Τίτλος 1"/>
           <p:cNvSpPr>
             <a:spLocks noGrp="1"/>
           </p:cNvSpPr>
@@ -2373,7 +2372,7 @@
           <a:p>
             <a:r>
               <a:rPr lang="el-GR" smtClean="0"/>
-              <a:t>Click to edit Master title style</a:t>
+              <a:t>Στυλ κύριου τίτλου</a:t>
             </a:r>
             <a:endParaRPr lang="el-GR" dirty="0"/>
           </a:p>
@@ -2381,7 +2380,7 @@
       </p:sp>
       <p:sp>
         <p:nvSpPr>
-          <p:cNvPr id="3" name="Content Placeholder 2"/>
+          <p:cNvPr id="3" name="Θέση περιεχομένου 2"/>
           <p:cNvSpPr>
             <a:spLocks noGrp="1"/>
           </p:cNvSpPr>
@@ -2430,35 +2429,35 @@
             <a:pPr lvl="0"/>
             <a:r>
               <a:rPr lang="el-GR" smtClean="0"/>
-              <a:t>Click to edit Master text styles</a:t>
+              <a:t>Στυλ υποδείγματος κειμένου</a:t>
             </a:r>
           </a:p>
           <a:p>
             <a:pPr lvl="1"/>
             <a:r>
               <a:rPr lang="el-GR" smtClean="0"/>
-              <a:t>Second level</a:t>
+              <a:t>Δεύτερου επιπέδου</a:t>
             </a:r>
           </a:p>
           <a:p>
             <a:pPr lvl="2"/>
             <a:r>
               <a:rPr lang="el-GR" smtClean="0"/>
-              <a:t>Third level</a:t>
+              <a:t>Τρίτου επιπέδου</a:t>
             </a:r>
           </a:p>
           <a:p>
             <a:pPr lvl="3"/>
             <a:r>
               <a:rPr lang="el-GR" smtClean="0"/>
-              <a:t>Fourth level</a:t>
+              <a:t>Τέταρτου επιπέδου</a:t>
             </a:r>
           </a:p>
           <a:p>
             <a:pPr lvl="4"/>
             <a:r>
               <a:rPr lang="el-GR" smtClean="0"/>
-              <a:t>Fifth level</a:t>
+              <a:t>Πέμπτου επιπέδου</a:t>
             </a:r>
             <a:endParaRPr lang="el-GR" dirty="0"/>
           </a:p>
@@ -2466,7 +2465,7 @@
       </p:sp>
       <p:sp>
         <p:nvSpPr>
-          <p:cNvPr id="4" name="Text Placeholder 3"/>
+          <p:cNvPr id="4" name="Θέση κειμένου 3"/>
           <p:cNvSpPr>
             <a:spLocks noGrp="1"/>
           </p:cNvSpPr>
@@ -2524,14 +2523,14 @@
             <a:pPr lvl="0"/>
             <a:r>
               <a:rPr lang="el-GR" smtClean="0"/>
-              <a:t>Click to edit Master text styles</a:t>
-            </a:r>
-          </a:p>
-        </p:txBody>
-      </p:sp>
-      <p:sp>
-        <p:nvSpPr>
-          <p:cNvPr id="5" name="Date Placeholder 4"/>
+              <a:t>Στυλ υποδείγματος κειμένου</a:t>
+            </a:r>
+          </a:p>
+        </p:txBody>
+      </p:sp>
+      <p:sp>
+        <p:nvSpPr>
+          <p:cNvPr id="5" name="Θέση ημερομηνίας 4"/>
           <p:cNvSpPr>
             <a:spLocks noGrp="1"/>
           </p:cNvSpPr>
@@ -2554,7 +2553,7 @@
       </p:sp>
       <p:sp>
         <p:nvSpPr>
-          <p:cNvPr id="6" name="Footer Placeholder 5"/>
+          <p:cNvPr id="6" name="Θέση υποσέλιδου 5"/>
           <p:cNvSpPr>
             <a:spLocks noGrp="1"/>
           </p:cNvSpPr>
@@ -2573,7 +2572,7 @@
       </p:sp>
       <p:sp>
         <p:nvSpPr>
-          <p:cNvPr id="7" name="Slide Number Placeholder 6"/>
+          <p:cNvPr id="7" name="Θέση αριθμού διαφάνειας 6"/>
           <p:cNvSpPr>
             <a:spLocks noGrp="1"/>
           </p:cNvSpPr>
@@ -2609,7 +2608,7 @@
 
 <file path=ppt/slideLayouts/slideLayout9.xml><?xml version="1.0" encoding="utf-8"?>
 <p:sldLayout xmlns:a="http://schemas.openxmlformats.org/drawingml/2006/main" xmlns:r="http://schemas.openxmlformats.org/officeDocument/2006/relationships" xmlns:p="http://schemas.openxmlformats.org/presentationml/2006/main" type="picTx" preserve="1">
-  <p:cSld name="Picture with Caption">
+  <p:cSld name="Εικόνα με λεζάντα">
     <p:spTree>
       <p:nvGrpSpPr>
         <p:cNvPr id="1" name=""/>
@@ -2626,7 +2625,7 @@
       </p:grpSpPr>
       <p:sp>
         <p:nvSpPr>
-          <p:cNvPr id="2" name="Title 1"/>
+          <p:cNvPr id="2" name="Τίτλος 1"/>
           <p:cNvSpPr>
             <a:spLocks noGrp="1"/>
           </p:cNvSpPr>
@@ -2650,7 +2649,7 @@
           <a:p>
             <a:r>
               <a:rPr lang="el-GR" smtClean="0"/>
-              <a:t>Click to edit Master title style</a:t>
+              <a:t>Στυλ κύριου τίτλου</a:t>
             </a:r>
             <a:endParaRPr lang="el-GR" dirty="0"/>
           </a:p>
@@ -2658,7 +2657,7 @@
       </p:sp>
       <p:sp>
         <p:nvSpPr>
-          <p:cNvPr id="3" name="Picture Placeholder 2"/>
+          <p:cNvPr id="3" name="Θέση εικόνας 2"/>
           <p:cNvSpPr>
             <a:spLocks noGrp="1" noChangeAspect="1"/>
           </p:cNvSpPr>
@@ -2723,7 +2722,7 @@
       </p:sp>
       <p:sp>
         <p:nvSpPr>
-          <p:cNvPr id="4" name="Text Placeholder 3"/>
+          <p:cNvPr id="4" name="Θέση κειμένου 3"/>
           <p:cNvSpPr>
             <a:spLocks noGrp="1"/>
           </p:cNvSpPr>
@@ -2781,14 +2780,14 @@
             <a:pPr lvl="0"/>
             <a:r>
               <a:rPr lang="el-GR" smtClean="0"/>
-              <a:t>Click to edit Master text styles</a:t>
-            </a:r>
-          </a:p>
-        </p:txBody>
-      </p:sp>
-      <p:sp>
-        <p:nvSpPr>
-          <p:cNvPr id="5" name="Date Placeholder 4"/>
+              <a:t>Στυλ υποδείγματος κειμένου</a:t>
+            </a:r>
+          </a:p>
+        </p:txBody>
+      </p:sp>
+      <p:sp>
+        <p:nvSpPr>
+          <p:cNvPr id="5" name="Θέση ημερομηνίας 4"/>
           <p:cNvSpPr>
             <a:spLocks noGrp="1"/>
           </p:cNvSpPr>
@@ -2811,7 +2810,7 @@
       </p:sp>
       <p:sp>
         <p:nvSpPr>
-          <p:cNvPr id="6" name="Footer Placeholder 5"/>
+          <p:cNvPr id="6" name="Θέση υποσέλιδου 5"/>
           <p:cNvSpPr>
             <a:spLocks noGrp="1"/>
           </p:cNvSpPr>
@@ -2830,7 +2829,7 @@
       </p:sp>
       <p:sp>
         <p:nvSpPr>
-          <p:cNvPr id="7" name="Slide Number Placeholder 6"/>
+          <p:cNvPr id="7" name="Θέση αριθμού διαφάνειας 6"/>
           <p:cNvSpPr>
             <a:spLocks noGrp="1"/>
           </p:cNvSpPr>

</xml_diff>